<commit_message>
Ballroom and Charaacter Slide
</commit_message>
<xml_diff>
--- a/Documents/Kickoff.pptx
+++ b/Documents/Kickoff.pptx
@@ -10,10 +10,10 @@
     <p:sldMasterId id="2147483697" r:id="rId6"/>
   </p:sldMasterIdLst>
   <p:notesMasterIdLst>
-    <p:notesMasterId r:id="rId25"/>
+    <p:notesMasterId r:id="rId26"/>
   </p:notesMasterIdLst>
   <p:handoutMasterIdLst>
-    <p:handoutMasterId r:id="rId26"/>
+    <p:handoutMasterId r:id="rId27"/>
   </p:handoutMasterIdLst>
   <p:sldIdLst>
     <p:sldId id="355" r:id="rId7"/>
@@ -33,7 +33,8 @@
     <p:sldId id="393" r:id="rId21"/>
     <p:sldId id="394" r:id="rId22"/>
     <p:sldId id="395" r:id="rId23"/>
-    <p:sldId id="381" r:id="rId24"/>
+    <p:sldId id="397" r:id="rId24"/>
+    <p:sldId id="381" r:id="rId25"/>
   </p:sldIdLst>
   <p:sldSz cx="9144000" cy="6858000" type="screen4x3"/>
   <p:notesSz cx="9925050" cy="6665913"/>
@@ -304,7 +305,7 @@
               <a:pPr>
                 <a:defRPr/>
               </a:pPr>
-              <a:t>28/05/2019</a:t>
+              <a:t>31/05/2019</a:t>
             </a:fld>
             <a:endParaRPr lang="en-GB" dirty="0"/>
           </a:p>
@@ -523,7 +524,7 @@
               <a:pPr>
                 <a:defRPr/>
               </a:pPr>
-              <a:t>28/05/2019</a:t>
+              <a:t>31/05/2019</a:t>
             </a:fld>
             <a:endParaRPr lang="en-GB"/>
           </a:p>
@@ -3502,10 +3503,6 @@
             <a:br>
               <a:rPr lang="de-DE" noProof="0" dirty="0"/>
             </a:br>
-            <a:r>
-              <a:rPr lang="de-DE" noProof="0" dirty="0"/>
-              <a:t/>
-            </a:r>
             <a:br>
               <a:rPr lang="de-DE" noProof="0" dirty="0"/>
             </a:br>
@@ -3927,10 +3924,6 @@
             <a:br>
               <a:rPr lang="de-DE" noProof="0" dirty="0"/>
             </a:br>
-            <a:r>
-              <a:rPr lang="de-DE" noProof="0" dirty="0"/>
-              <a:t/>
-            </a:r>
             <a:br>
               <a:rPr lang="de-DE" noProof="0" dirty="0"/>
             </a:br>
@@ -12509,6 +12502,216 @@
           <a:chExt cx="0" cy="0"/>
         </a:xfrm>
       </p:grpSpPr>
+      <p:pic>
+        <p:nvPicPr>
+          <p:cNvPr id="7" name="Inhaltsplatzhalter 6">
+            <a:extLst>
+              <a:ext uri="{FF2B5EF4-FFF2-40B4-BE49-F238E27FC236}">
+                <a16:creationId xmlns:a16="http://schemas.microsoft.com/office/drawing/2014/main" id="{6798A965-DAA6-4D31-8F83-8F43B3554049}"/>
+              </a:ext>
+            </a:extLst>
+          </p:cNvPr>
+          <p:cNvPicPr>
+            <a:picLocks noGrp="1" noChangeAspect="1"/>
+          </p:cNvPicPr>
+          <p:nvPr>
+            <p:ph idx="1"/>
+          </p:nvPr>
+        </p:nvPicPr>
+        <p:blipFill>
+          <a:blip r:embed="rId2"/>
+          <a:stretch>
+            <a:fillRect/>
+          </a:stretch>
+        </p:blipFill>
+        <p:spPr>
+          <a:xfrm>
+            <a:off x="832168" y="2347595"/>
+            <a:ext cx="7482840" cy="3528060"/>
+          </a:xfrm>
+        </p:spPr>
+      </p:pic>
+      <p:sp>
+        <p:nvSpPr>
+          <p:cNvPr id="3" name="Foliennummernplatzhalter 2">
+            <a:extLst>
+              <a:ext uri="{FF2B5EF4-FFF2-40B4-BE49-F238E27FC236}">
+                <a16:creationId xmlns:a16="http://schemas.microsoft.com/office/drawing/2014/main" id="{4F939F44-4018-42FB-A984-D9C66FDB6280}"/>
+              </a:ext>
+            </a:extLst>
+          </p:cNvPr>
+          <p:cNvSpPr>
+            <a:spLocks noGrp="1"/>
+          </p:cNvSpPr>
+          <p:nvPr>
+            <p:ph type="sldNum" sz="quarter" idx="11"/>
+          </p:nvPr>
+        </p:nvSpPr>
+        <p:spPr/>
+        <p:txBody>
+          <a:bodyPr/>
+          <a:lstStyle/>
+          <a:p>
+            <a:fld id="{CE58CB1E-F828-4F11-99E0-327109AF9DA4}" type="slidenum">
+              <a:rPr lang="de-DE" smtClean="0"/>
+              <a:pPr/>
+              <a:t>18</a:t>
+            </a:fld>
+            <a:endParaRPr lang="de-DE" dirty="0"/>
+          </a:p>
+        </p:txBody>
+      </p:sp>
+      <p:sp>
+        <p:nvSpPr>
+          <p:cNvPr id="4" name="Fußzeilenplatzhalter 3">
+            <a:extLst>
+              <a:ext uri="{FF2B5EF4-FFF2-40B4-BE49-F238E27FC236}">
+                <a16:creationId xmlns:a16="http://schemas.microsoft.com/office/drawing/2014/main" id="{5FFDD073-C1B7-45B1-B94B-9B844C5E052C}"/>
+              </a:ext>
+            </a:extLst>
+          </p:cNvPr>
+          <p:cNvSpPr>
+            <a:spLocks noGrp="1"/>
+          </p:cNvSpPr>
+          <p:nvPr>
+            <p:ph type="ftr" sz="quarter" idx="12"/>
+          </p:nvPr>
+        </p:nvSpPr>
+        <p:spPr/>
+        <p:txBody>
+          <a:bodyPr/>
+          <a:lstStyle/>
+          <a:p>
+            <a:r>
+              <a:rPr lang="de-DE" dirty="0"/>
+              <a:t>Konstantin Karas, Min Ting Luong, Jakob Raith</a:t>
+            </a:r>
+          </a:p>
+        </p:txBody>
+      </p:sp>
+      <p:sp>
+        <p:nvSpPr>
+          <p:cNvPr id="5" name="Titel 4">
+            <a:extLst>
+              <a:ext uri="{FF2B5EF4-FFF2-40B4-BE49-F238E27FC236}">
+                <a16:creationId xmlns:a16="http://schemas.microsoft.com/office/drawing/2014/main" id="{A987D224-5DB1-4D47-B2B8-3EDE5635636D}"/>
+              </a:ext>
+            </a:extLst>
+          </p:cNvPr>
+          <p:cNvSpPr>
+            <a:spLocks noGrp="1"/>
+          </p:cNvSpPr>
+          <p:nvPr>
+            <p:ph type="title"/>
+          </p:nvPr>
+        </p:nvSpPr>
+        <p:spPr/>
+        <p:txBody>
+          <a:bodyPr/>
+          <a:lstStyle/>
+          <a:p>
+            <a:r>
+              <a:rPr lang="de-DE" dirty="0"/>
+              <a:t>Ballroom and </a:t>
+            </a:r>
+            <a:r>
+              <a:rPr lang="de-DE" dirty="0" err="1"/>
+              <a:t>Character</a:t>
+            </a:r>
+            <a:endParaRPr lang="de-DE" dirty="0"/>
+          </a:p>
+        </p:txBody>
+      </p:sp>
+      <p:pic>
+        <p:nvPicPr>
+          <p:cNvPr id="9" name="Grafik 8">
+            <a:extLst>
+              <a:ext uri="{FF2B5EF4-FFF2-40B4-BE49-F238E27FC236}">
+                <a16:creationId xmlns:a16="http://schemas.microsoft.com/office/drawing/2014/main" id="{6D5B4F30-74B6-4CE8-8027-6EA405222A89}"/>
+              </a:ext>
+            </a:extLst>
+          </p:cNvPr>
+          <p:cNvPicPr>
+            <a:picLocks noChangeAspect="1"/>
+          </p:cNvPicPr>
+          <p:nvPr/>
+        </p:nvPicPr>
+        <p:blipFill>
+          <a:blip r:embed="rId3"/>
+          <a:stretch>
+            <a:fillRect/>
+          </a:stretch>
+        </p:blipFill>
+        <p:spPr>
+          <a:xfrm>
+            <a:off x="4793942" y="431122"/>
+            <a:ext cx="3084498" cy="1735030"/>
+          </a:xfrm>
+          <a:prstGeom prst="rect">
+            <a:avLst/>
+          </a:prstGeom>
+        </p:spPr>
+      </p:pic>
+      <p:pic>
+        <p:nvPicPr>
+          <p:cNvPr id="11" name="Grafik 10">
+            <a:extLst>
+              <a:ext uri="{FF2B5EF4-FFF2-40B4-BE49-F238E27FC236}">
+                <a16:creationId xmlns:a16="http://schemas.microsoft.com/office/drawing/2014/main" id="{EDD75437-5E99-4E0A-90C9-75A7902FD97B}"/>
+              </a:ext>
+            </a:extLst>
+          </p:cNvPr>
+          <p:cNvPicPr>
+            <a:picLocks noChangeAspect="1"/>
+          </p:cNvPicPr>
+          <p:nvPr/>
+        </p:nvPicPr>
+        <p:blipFill>
+          <a:blip r:embed="rId4"/>
+          <a:stretch>
+            <a:fillRect/>
+          </a:stretch>
+        </p:blipFill>
+        <p:spPr>
+          <a:xfrm>
+            <a:off x="3000652" y="5089981"/>
+            <a:ext cx="2326937" cy="1308902"/>
+          </a:xfrm>
+          <a:prstGeom prst="rect">
+            <a:avLst/>
+          </a:prstGeom>
+        </p:spPr>
+      </p:pic>
+    </p:spTree>
+    <p:extLst>
+      <p:ext uri="{BB962C8B-B14F-4D97-AF65-F5344CB8AC3E}">
+        <p14:creationId xmlns:p14="http://schemas.microsoft.com/office/powerpoint/2010/main" val="3669891633"/>
+      </p:ext>
+    </p:extLst>
+  </p:cSld>
+  <p:clrMapOvr>
+    <a:masterClrMapping/>
+  </p:clrMapOvr>
+</p:sld>
+</file>
+
+<file path=ppt/slides/slide19.xml><?xml version="1.0" encoding="utf-8"?>
+<p:sld xmlns:a="http://schemas.openxmlformats.org/drawingml/2006/main" xmlns:r="http://schemas.openxmlformats.org/officeDocument/2006/relationships" xmlns:p="http://schemas.openxmlformats.org/presentationml/2006/main">
+  <p:cSld>
+    <p:spTree>
+      <p:nvGrpSpPr>
+        <p:cNvPr id="1" name=""/>
+        <p:cNvGrpSpPr/>
+        <p:nvPr/>
+      </p:nvGrpSpPr>
+      <p:grpSpPr>
+        <a:xfrm>
+          <a:off x="0" y="0"/>
+          <a:ext cx="0" cy="0"/>
+          <a:chOff x="0" y="0"/>
+          <a:chExt cx="0" cy="0"/>
+        </a:xfrm>
+      </p:grpSpPr>
       <p:sp>
         <p:nvSpPr>
           <p:cNvPr id="4" name="Foliennummernplatzhalter 3"/>
@@ -12527,7 +12730,7 @@
             <a:fld id="{CE58CB1E-F828-4F11-99E0-327109AF9DA4}" type="slidenum">
               <a:rPr lang="de-DE" smtClean="0"/>
               <a:pPr/>
-              <a:t>18</a:t>
+              <a:t>19</a:t>
             </a:fld>
             <a:endParaRPr lang="de-DE" dirty="0"/>
           </a:p>
@@ -12726,16 +12929,12 @@
               <a:buChar char="•"/>
             </a:pPr>
             <a:r>
-              <a:rPr lang="de-DE" dirty="0" err="1" smtClean="0"/>
+              <a:rPr lang="de-DE" dirty="0" err="1"/>
               <a:t>mainly</a:t>
             </a:r>
             <a:r>
-              <a:rPr lang="de-DE" dirty="0" smtClean="0"/>
-              <a:t> </a:t>
-            </a:r>
-            <a:r>
               <a:rPr lang="de-DE" dirty="0"/>
-              <a:t>„Schauspiel“ </a:t>
+              <a:t> „Schauspiel“ </a:t>
             </a:r>
             <a:r>
               <a:rPr lang="de-DE" dirty="0" err="1"/>

</xml_diff>

<commit_message>
even slightlier(?) slide change
</commit_message>
<xml_diff>
--- a/Documents/Kickoff.pptx
+++ b/Documents/Kickoff.pptx
@@ -165,7 +165,7 @@
   </p:defaultTextStyle>
   <p:extLst>
     <p:ext uri="{EFAFB233-063F-42B5-8137-9DF3F51BA10A}">
-      <p15:sldGuideLst xmlns:p15="http://schemas.microsoft.com/office/powerpoint/2012/main" xmlns="">
+      <p15:sldGuideLst xmlns="" xmlns:p15="http://schemas.microsoft.com/office/powerpoint/2012/main">
         <p15:guide id="1" orient="horz" pos="2160">
           <p15:clr>
             <a:srgbClr val="A4A3A4"/>
@@ -179,7 +179,7 @@
       </p15:sldGuideLst>
     </p:ext>
     <p:ext uri="{2D200454-40CA-4A62-9FC3-DE9A4176ACB9}">
-      <p15:notesGuideLst xmlns:p15="http://schemas.microsoft.com/office/powerpoint/2012/main" xmlns="">
+      <p15:notesGuideLst xmlns="" xmlns:p15="http://schemas.microsoft.com/office/powerpoint/2012/main">
         <p15:guide id="1" orient="horz" pos="2100">
           <p15:clr>
             <a:srgbClr val="A4A3A4"/>
@@ -11806,15 +11806,7 @@
             </a:pPr>
             <a:r>
               <a:rPr lang="en-US" dirty="0" smtClean="0"/>
-              <a:t>Gesture evaluation </a:t>
-            </a:r>
-            <a:r>
-              <a:rPr lang="en-US" dirty="0" smtClean="0"/>
-              <a:t>(preliminary version</a:t>
-            </a:r>
-            <a:r>
-              <a:rPr lang="en-US" dirty="0" smtClean="0"/>
-              <a:t>)</a:t>
+              <a:t>Gesture evaluation (preliminary version)</a:t>
             </a:r>
             <a:endParaRPr lang="en-US" dirty="0"/>
           </a:p>
@@ -12548,7 +12540,7 @@
           <p:cNvPr id="7" name="Inhaltsplatzhalter 6">
             <a:extLst>
               <a:ext uri="{FF2B5EF4-FFF2-40B4-BE49-F238E27FC236}">
-                <a16:creationId xmlns:a16="http://schemas.microsoft.com/office/drawing/2014/main" xmlns="" id="{6798A965-DAA6-4D31-8F83-8F43B3554049}"/>
+                <a16:creationId xmlns="" xmlns:a16="http://schemas.microsoft.com/office/drawing/2014/main" id="{6798A965-DAA6-4D31-8F83-8F43B3554049}"/>
               </a:ext>
             </a:extLst>
           </p:cNvPr>
@@ -12577,7 +12569,7 @@
           <p:cNvPr id="3" name="Foliennummernplatzhalter 2">
             <a:extLst>
               <a:ext uri="{FF2B5EF4-FFF2-40B4-BE49-F238E27FC236}">
-                <a16:creationId xmlns:a16="http://schemas.microsoft.com/office/drawing/2014/main" xmlns="" id="{4F939F44-4018-42FB-A984-D9C66FDB6280}"/>
+                <a16:creationId xmlns="" xmlns:a16="http://schemas.microsoft.com/office/drawing/2014/main" id="{4F939F44-4018-42FB-A984-D9C66FDB6280}"/>
               </a:ext>
             </a:extLst>
           </p:cNvPr>
@@ -12607,7 +12599,7 @@
           <p:cNvPr id="4" name="Fußzeilenplatzhalter 3">
             <a:extLst>
               <a:ext uri="{FF2B5EF4-FFF2-40B4-BE49-F238E27FC236}">
-                <a16:creationId xmlns:a16="http://schemas.microsoft.com/office/drawing/2014/main" xmlns="" id="{5FFDD073-C1B7-45B1-B94B-9B844C5E052C}"/>
+                <a16:creationId xmlns="" xmlns:a16="http://schemas.microsoft.com/office/drawing/2014/main" id="{5FFDD073-C1B7-45B1-B94B-9B844C5E052C}"/>
               </a:ext>
             </a:extLst>
           </p:cNvPr>
@@ -12635,7 +12627,7 @@
           <p:cNvPr id="5" name="Titel 4">
             <a:extLst>
               <a:ext uri="{FF2B5EF4-FFF2-40B4-BE49-F238E27FC236}">
-                <a16:creationId xmlns:a16="http://schemas.microsoft.com/office/drawing/2014/main" xmlns="" id="{A987D224-5DB1-4D47-B2B8-3EDE5635636D}"/>
+                <a16:creationId xmlns="" xmlns:a16="http://schemas.microsoft.com/office/drawing/2014/main" id="{A987D224-5DB1-4D47-B2B8-3EDE5635636D}"/>
               </a:ext>
             </a:extLst>
           </p:cNvPr>
@@ -12668,7 +12660,7 @@
           <p:cNvPr id="9" name="Grafik 8">
             <a:extLst>
               <a:ext uri="{FF2B5EF4-FFF2-40B4-BE49-F238E27FC236}">
-                <a16:creationId xmlns:a16="http://schemas.microsoft.com/office/drawing/2014/main" xmlns="" id="{6D5B4F30-74B6-4CE8-8027-6EA405222A89}"/>
+                <a16:creationId xmlns="" xmlns:a16="http://schemas.microsoft.com/office/drawing/2014/main" id="{6D5B4F30-74B6-4CE8-8027-6EA405222A89}"/>
               </a:ext>
             </a:extLst>
           </p:cNvPr>
@@ -12893,7 +12885,7 @@
           <p:cNvPr id="2" name="Inhaltsplatzhalter 1">
             <a:extLst>
               <a:ext uri="{FF2B5EF4-FFF2-40B4-BE49-F238E27FC236}">
-                <a16:creationId xmlns:a16="http://schemas.microsoft.com/office/drawing/2014/main" xmlns="" id="{78D55584-F8AF-4DD2-BF17-4530DDAEF005}"/>
+                <a16:creationId xmlns="" xmlns:a16="http://schemas.microsoft.com/office/drawing/2014/main" id="{78D55584-F8AF-4DD2-BF17-4530DDAEF005}"/>
               </a:ext>
             </a:extLst>
           </p:cNvPr>
@@ -13026,7 +13018,7 @@
           <p:cNvPr id="3" name="Titel 2">
             <a:extLst>
               <a:ext uri="{FF2B5EF4-FFF2-40B4-BE49-F238E27FC236}">
-                <a16:creationId xmlns:a16="http://schemas.microsoft.com/office/drawing/2014/main" xmlns="" id="{E16A3B7F-8CC8-4399-88CD-418B949242F1}"/>
+                <a16:creationId xmlns="" xmlns:a16="http://schemas.microsoft.com/office/drawing/2014/main" id="{E16A3B7F-8CC8-4399-88CD-418B949242F1}"/>
               </a:ext>
             </a:extLst>
           </p:cNvPr>
@@ -13331,9 +13323,10 @@
               <a:buChar char="•"/>
             </a:pPr>
             <a:r>
-              <a:rPr lang="en-US" dirty="0"/>
-              <a:t>Third Person, over the shoulder perspective</a:t>
-            </a:r>
+              <a:rPr lang="en-US" smtClean="0"/>
+              <a:t>(mostly) Third Person perspective</a:t>
+            </a:r>
+            <a:endParaRPr lang="en-US" dirty="0"/>
           </a:p>
           <a:p>
             <a:pPr marL="285750" indent="-285750">
@@ -19376,7 +19369,7 @@
   <a:extraClrSchemeLst/>
   <a:extLst>
     <a:ext uri="{05A4C25C-085E-4340-85A3-A5531E510DB2}">
-      <thm15:themeFamily xmlns:thm15="http://schemas.microsoft.com/office/thememl/2012/main" xmlns="" name="Präsentation14" id="{B1B10406-6147-4A47-95F4-F5DBD10A3872}" vid="{D4FD95B4-ED9B-E343-B70F-8C404733D84C}"/>
+      <thm15:themeFamily xmlns="" xmlns:thm15="http://schemas.microsoft.com/office/thememl/2012/main" name="Präsentation14" id="{B1B10406-6147-4A47-95F4-F5DBD10A3872}" vid="{D4FD95B4-ED9B-E343-B70F-8C404733D84C}"/>
     </a:ext>
   </a:extLst>
 </a:theme>
@@ -19662,7 +19655,7 @@
   <a:extraClrSchemeLst/>
   <a:extLst>
     <a:ext uri="{05A4C25C-085E-4340-85A3-A5531E510DB2}">
-      <thm15:themeFamily xmlns:thm15="http://schemas.microsoft.com/office/thememl/2012/main" xmlns="" name="Präsentation14" id="{B1B10406-6147-4A47-95F4-F5DBD10A3872}" vid="{E7490A93-BEAC-FC49-93F3-0CC1118C542C}"/>
+      <thm15:themeFamily xmlns="" xmlns:thm15="http://schemas.microsoft.com/office/thememl/2012/main" name="Präsentation14" id="{B1B10406-6147-4A47-95F4-F5DBD10A3872}" vid="{E7490A93-BEAC-FC49-93F3-0CC1118C542C}"/>
     </a:ext>
   </a:extLst>
 </a:theme>
@@ -19948,7 +19941,7 @@
   <a:extraClrSchemeLst/>
   <a:extLst>
     <a:ext uri="{05A4C25C-085E-4340-85A3-A5531E510DB2}">
-      <thm15:themeFamily xmlns:thm15="http://schemas.microsoft.com/office/thememl/2012/main" xmlns="" name="Präsentation14" id="{B1B10406-6147-4A47-95F4-F5DBD10A3872}" vid="{4DDB14AD-D1C4-854B-AC86-049FDE8761EC}"/>
+      <thm15:themeFamily xmlns="" xmlns:thm15="http://schemas.microsoft.com/office/thememl/2012/main" name="Präsentation14" id="{B1B10406-6147-4A47-95F4-F5DBD10A3872}" vid="{4DDB14AD-D1C4-854B-AC86-049FDE8761EC}"/>
     </a:ext>
   </a:extLst>
 </a:theme>
@@ -20234,7 +20227,7 @@
   <a:extraClrSchemeLst/>
   <a:extLst>
     <a:ext uri="{05A4C25C-085E-4340-85A3-A5531E510DB2}">
-      <thm15:themeFamily xmlns:thm15="http://schemas.microsoft.com/office/thememl/2012/main" xmlns="" name="Präsentation14" id="{B1B10406-6147-4A47-95F4-F5DBD10A3872}" vid="{4F4851FE-32D1-2D41-BECA-D90EB3BB8DB1}"/>
+      <thm15:themeFamily xmlns="" xmlns:thm15="http://schemas.microsoft.com/office/thememl/2012/main" name="Präsentation14" id="{B1B10406-6147-4A47-95F4-F5DBD10A3872}" vid="{4F4851FE-32D1-2D41-BECA-D90EB3BB8DB1}"/>
     </a:ext>
   </a:extLst>
 </a:theme>
@@ -20520,7 +20513,7 @@
   <a:extraClrSchemeLst/>
   <a:extLst>
     <a:ext uri="{05A4C25C-085E-4340-85A3-A5531E510DB2}">
-      <thm15:themeFamily xmlns:thm15="http://schemas.microsoft.com/office/thememl/2012/main" xmlns="" name="Präsentation14" id="{B1B10406-6147-4A47-95F4-F5DBD10A3872}" vid="{13591B48-8E13-6247-8040-92522EC77656}"/>
+      <thm15:themeFamily xmlns="" xmlns:thm15="http://schemas.microsoft.com/office/thememl/2012/main" name="Präsentation14" id="{B1B10406-6147-4A47-95F4-F5DBD10A3872}" vid="{13591B48-8E13-6247-8040-92522EC77656}"/>
     </a:ext>
   </a:extLst>
 </a:theme>
@@ -20806,7 +20799,7 @@
   <a:extraClrSchemeLst/>
   <a:extLst>
     <a:ext uri="{05A4C25C-085E-4340-85A3-A5531E510DB2}">
-      <thm15:themeFamily xmlns:thm15="http://schemas.microsoft.com/office/thememl/2012/main" xmlns="" name="Präsentation14" id="{B1B10406-6147-4A47-95F4-F5DBD10A3872}" vid="{BAD62DF3-579B-3B4C-BB35-887AD0E01A2D}"/>
+      <thm15:themeFamily xmlns="" xmlns:thm15="http://schemas.microsoft.com/office/thememl/2012/main" name="Präsentation14" id="{B1B10406-6147-4A47-95F4-F5DBD10A3872}" vid="{BAD62DF3-579B-3B4C-BB35-887AD0E01A2D}"/>
     </a:ext>
   </a:extLst>
 </a:theme>

</xml_diff>

<commit_message>
added the dude himself
</commit_message>
<xml_diff>
--- a/Documents/Kickoff.pptx
+++ b/Documents/Kickoff.pptx
@@ -165,7 +165,7 @@
   </p:defaultTextStyle>
   <p:extLst>
     <p:ext uri="{EFAFB233-063F-42B5-8137-9DF3F51BA10A}">
-      <p15:sldGuideLst xmlns="" xmlns:p15="http://schemas.microsoft.com/office/powerpoint/2012/main">
+      <p15:sldGuideLst xmlns:p15="http://schemas.microsoft.com/office/powerpoint/2012/main">
         <p15:guide id="1" orient="horz" pos="2160">
           <p15:clr>
             <a:srgbClr val="A4A3A4"/>
@@ -179,7 +179,7 @@
       </p15:sldGuideLst>
     </p:ext>
     <p:ext uri="{2D200454-40CA-4A62-9FC3-DE9A4176ACB9}">
-      <p15:notesGuideLst xmlns="" xmlns:p15="http://schemas.microsoft.com/office/powerpoint/2012/main">
+      <p15:notesGuideLst xmlns:p15="http://schemas.microsoft.com/office/powerpoint/2012/main">
         <p15:guide id="1" orient="horz" pos="2100">
           <p15:clr>
             <a:srgbClr val="A4A3A4"/>
@@ -305,7 +305,7 @@
               <a:pPr>
                 <a:defRPr/>
               </a:pPr>
-              <a:t>06/06/2019</a:t>
+              <a:t>07/06/2019</a:t>
             </a:fld>
             <a:endParaRPr lang="en-GB" dirty="0"/>
           </a:p>
@@ -524,7 +524,7 @@
               <a:pPr>
                 <a:defRPr/>
               </a:pPr>
-              <a:t>06/06/2019</a:t>
+              <a:t>07/06/2019</a:t>
             </a:fld>
             <a:endParaRPr lang="en-GB"/>
           </a:p>
@@ -9128,7 +9128,19 @@
           <a:p>
             <a:r>
               <a:rPr lang="de-DE" dirty="0"/>
-              <a:t>Garching, 31. Mai 2019</a:t>
+              <a:t>Garching, </a:t>
+            </a:r>
+            <a:r>
+              <a:rPr lang="de-DE" dirty="0" smtClean="0"/>
+              <a:t>07</a:t>
+            </a:r>
+            <a:r>
+              <a:rPr lang="de-DE" dirty="0" smtClean="0"/>
+              <a:t>. Juni </a:t>
+            </a:r>
+            <a:r>
+              <a:rPr lang="de-DE" dirty="0"/>
+              <a:t>2019</a:t>
             </a:r>
             <a:endParaRPr dirty="0"/>
           </a:p>
@@ -12540,7 +12552,7 @@
           <p:cNvPr id="7" name="Inhaltsplatzhalter 6">
             <a:extLst>
               <a:ext uri="{FF2B5EF4-FFF2-40B4-BE49-F238E27FC236}">
-                <a16:creationId xmlns="" xmlns:a16="http://schemas.microsoft.com/office/drawing/2014/main" id="{6798A965-DAA6-4D31-8F83-8F43B3554049}"/>
+                <a16:creationId xmlns:a16="http://schemas.microsoft.com/office/drawing/2014/main" id="{6798A965-DAA6-4D31-8F83-8F43B3554049}"/>
               </a:ext>
             </a:extLst>
           </p:cNvPr>
@@ -12559,8 +12571,8 @@
         </p:blipFill>
         <p:spPr>
           <a:xfrm>
-            <a:off x="832168" y="2347595"/>
-            <a:ext cx="7482840" cy="3528060"/>
+            <a:off x="319089" y="1432605"/>
+            <a:ext cx="4901303" cy="2310899"/>
           </a:xfrm>
         </p:spPr>
       </p:pic>
@@ -12569,7 +12581,7 @@
           <p:cNvPr id="3" name="Foliennummernplatzhalter 2">
             <a:extLst>
               <a:ext uri="{FF2B5EF4-FFF2-40B4-BE49-F238E27FC236}">
-                <a16:creationId xmlns="" xmlns:a16="http://schemas.microsoft.com/office/drawing/2014/main" id="{4F939F44-4018-42FB-A984-D9C66FDB6280}"/>
+                <a16:creationId xmlns:a16="http://schemas.microsoft.com/office/drawing/2014/main" id="{4F939F44-4018-42FB-A984-D9C66FDB6280}"/>
               </a:ext>
             </a:extLst>
           </p:cNvPr>
@@ -12599,7 +12611,7 @@
           <p:cNvPr id="4" name="Fußzeilenplatzhalter 3">
             <a:extLst>
               <a:ext uri="{FF2B5EF4-FFF2-40B4-BE49-F238E27FC236}">
-                <a16:creationId xmlns="" xmlns:a16="http://schemas.microsoft.com/office/drawing/2014/main" id="{5FFDD073-C1B7-45B1-B94B-9B844C5E052C}"/>
+                <a16:creationId xmlns:a16="http://schemas.microsoft.com/office/drawing/2014/main" id="{5FFDD073-C1B7-45B1-B94B-9B844C5E052C}"/>
               </a:ext>
             </a:extLst>
           </p:cNvPr>
@@ -12627,7 +12639,7 @@
           <p:cNvPr id="5" name="Titel 4">
             <a:extLst>
               <a:ext uri="{FF2B5EF4-FFF2-40B4-BE49-F238E27FC236}">
-                <a16:creationId xmlns="" xmlns:a16="http://schemas.microsoft.com/office/drawing/2014/main" id="{A987D224-5DB1-4D47-B2B8-3EDE5635636D}"/>
+                <a16:creationId xmlns:a16="http://schemas.microsoft.com/office/drawing/2014/main" id="{A987D224-5DB1-4D47-B2B8-3EDE5635636D}"/>
               </a:ext>
             </a:extLst>
           </p:cNvPr>
@@ -12660,7 +12672,7 @@
           <p:cNvPr id="9" name="Grafik 8">
             <a:extLst>
               <a:ext uri="{FF2B5EF4-FFF2-40B4-BE49-F238E27FC236}">
-                <a16:creationId xmlns="" xmlns:a16="http://schemas.microsoft.com/office/drawing/2014/main" id="{6D5B4F30-74B6-4CE8-8027-6EA405222A89}"/>
+                <a16:creationId xmlns:a16="http://schemas.microsoft.com/office/drawing/2014/main" id="{6D5B4F30-74B6-4CE8-8027-6EA405222A89}"/>
               </a:ext>
             </a:extLst>
           </p:cNvPr>
@@ -12677,8 +12689,55 @@
         </p:blipFill>
         <p:spPr>
           <a:xfrm>
-            <a:off x="4793942" y="431122"/>
+            <a:off x="5562570" y="3071493"/>
             <a:ext cx="3084498" cy="1735030"/>
+          </a:xfrm>
+          <a:prstGeom prst="rect">
+            <a:avLst/>
+          </a:prstGeom>
+        </p:spPr>
+      </p:pic>
+      <p:pic>
+        <p:nvPicPr>
+          <p:cNvPr id="2" name="Grafik 1"/>
+          <p:cNvPicPr>
+            <a:picLocks noChangeAspect="1"/>
+          </p:cNvPicPr>
+          <p:nvPr/>
+        </p:nvPicPr>
+        <p:blipFill rotWithShape="1">
+          <a:blip r:embed="rId4"/>
+          <a:srcRect l="26456" r="29192"/>
+          <a:stretch/>
+        </p:blipFill>
+        <p:spPr>
+          <a:xfrm>
+            <a:off x="3409189" y="3851537"/>
+            <a:ext cx="1811203" cy="2326664"/>
+          </a:xfrm>
+          <a:prstGeom prst="rect">
+            <a:avLst/>
+          </a:prstGeom>
+        </p:spPr>
+      </p:pic>
+      <p:pic>
+        <p:nvPicPr>
+          <p:cNvPr id="6" name="Grafik 5"/>
+          <p:cNvPicPr>
+            <a:picLocks noChangeAspect="1"/>
+          </p:cNvPicPr>
+          <p:nvPr/>
+        </p:nvPicPr>
+        <p:blipFill>
+          <a:blip r:embed="rId5"/>
+          <a:stretch>
+            <a:fillRect/>
+          </a:stretch>
+        </p:blipFill>
+        <p:spPr>
+          <a:xfrm>
+            <a:off x="319089" y="3852722"/>
+            <a:ext cx="2681420" cy="2325479"/>
           </a:xfrm>
           <a:prstGeom prst="rect">
             <a:avLst/>
@@ -12885,7 +12944,7 @@
           <p:cNvPr id="2" name="Inhaltsplatzhalter 1">
             <a:extLst>
               <a:ext uri="{FF2B5EF4-FFF2-40B4-BE49-F238E27FC236}">
-                <a16:creationId xmlns="" xmlns:a16="http://schemas.microsoft.com/office/drawing/2014/main" id="{78D55584-F8AF-4DD2-BF17-4530DDAEF005}"/>
+                <a16:creationId xmlns:a16="http://schemas.microsoft.com/office/drawing/2014/main" id="{78D55584-F8AF-4DD2-BF17-4530DDAEF005}"/>
               </a:ext>
             </a:extLst>
           </p:cNvPr>
@@ -13009,6 +13068,77 @@
               <a:rPr lang="de-DE" dirty="0" err="1" smtClean="0"/>
               <a:t>setting</a:t>
             </a:r>
+            <a:endParaRPr lang="de-DE" dirty="0" smtClean="0"/>
+          </a:p>
+          <a:p>
+            <a:pPr marL="285750" indent="-285750">
+              <a:buFont typeface="Arial" panose="020B0604020202020204" pitchFamily="34" charset="0"/>
+              <a:buChar char="•"/>
+            </a:pPr>
+            <a:r>
+              <a:rPr lang="de-DE" dirty="0"/>
+              <a:t>Inspiration: </a:t>
+            </a:r>
+            <a:r>
+              <a:rPr lang="de-DE" dirty="0" err="1"/>
+              <a:t>Hiding</a:t>
+            </a:r>
+            <a:r>
+              <a:rPr lang="de-DE" dirty="0"/>
+              <a:t> in </a:t>
+            </a:r>
+            <a:r>
+              <a:rPr lang="de-DE" dirty="0" err="1"/>
+              <a:t>the</a:t>
+            </a:r>
+            <a:r>
+              <a:rPr lang="de-DE" dirty="0"/>
+              <a:t> </a:t>
+            </a:r>
+            <a:r>
+              <a:rPr lang="de-DE" dirty="0" err="1"/>
+              <a:t>crowd</a:t>
+            </a:r>
+            <a:r>
+              <a:rPr lang="de-DE" dirty="0"/>
+              <a:t> </a:t>
+            </a:r>
+            <a:r>
+              <a:rPr lang="de-DE" dirty="0" err="1"/>
+              <a:t>mechanic</a:t>
+            </a:r>
+            <a:r>
+              <a:rPr lang="de-DE" dirty="0"/>
+              <a:t> </a:t>
+            </a:r>
+            <a:r>
+              <a:rPr lang="de-DE" dirty="0" err="1"/>
+              <a:t>from</a:t>
+            </a:r>
+            <a:r>
+              <a:rPr lang="de-DE" dirty="0"/>
+              <a:t> </a:t>
+            </a:r>
+            <a:r>
+              <a:rPr lang="de-DE" dirty="0" err="1"/>
+              <a:t>Assassins</a:t>
+            </a:r>
+            <a:r>
+              <a:rPr lang="de-DE" dirty="0"/>
+              <a:t> </a:t>
+            </a:r>
+            <a:r>
+              <a:rPr lang="de-DE" dirty="0" err="1"/>
+              <a:t>Creed</a:t>
+            </a:r>
+            <a:r>
+              <a:rPr lang="de-DE" dirty="0"/>
+              <a:t> </a:t>
+            </a:r>
+            <a:r>
+              <a:rPr lang="de-DE" dirty="0" err="1" smtClean="0"/>
+              <a:t>franchise</a:t>
+            </a:r>
             <a:endParaRPr lang="de-DE" dirty="0"/>
           </a:p>
         </p:txBody>
@@ -13018,7 +13148,7 @@
           <p:cNvPr id="3" name="Titel 2">
             <a:extLst>
               <a:ext uri="{FF2B5EF4-FFF2-40B4-BE49-F238E27FC236}">
-                <a16:creationId xmlns="" xmlns:a16="http://schemas.microsoft.com/office/drawing/2014/main" id="{E16A3B7F-8CC8-4399-88CD-418B949242F1}"/>
+                <a16:creationId xmlns:a16="http://schemas.microsoft.com/office/drawing/2014/main" id="{E16A3B7F-8CC8-4399-88CD-418B949242F1}"/>
               </a:ext>
             </a:extLst>
           </p:cNvPr>
@@ -13166,8 +13296,19 @@
             </a:pPr>
             <a:r>
               <a:rPr lang="en-US" dirty="0"/>
-              <a:t>Player wins when they reach their target or loose when they get caught</a:t>
-            </a:r>
+              <a:t>Player wins when they reach their target or loose when they get </a:t>
+            </a:r>
+            <a:r>
+              <a:rPr lang="en-US" dirty="0" smtClean="0"/>
+              <a:t>caught</a:t>
+            </a:r>
+          </a:p>
+          <a:p>
+            <a:pPr marL="285750" indent="-285750">
+              <a:buFont typeface="Arial" panose="020B0604020202020204" pitchFamily="34" charset="0"/>
+              <a:buChar char="•"/>
+            </a:pPr>
+            <a:endParaRPr lang="en-US" dirty="0"/>
           </a:p>
           <a:p>
             <a:endParaRPr lang="en-US" dirty="0"/>
@@ -19369,7 +19510,7 @@
   <a:extraClrSchemeLst/>
   <a:extLst>
     <a:ext uri="{05A4C25C-085E-4340-85A3-A5531E510DB2}">
-      <thm15:themeFamily xmlns="" xmlns:thm15="http://schemas.microsoft.com/office/thememl/2012/main" name="Präsentation14" id="{B1B10406-6147-4A47-95F4-F5DBD10A3872}" vid="{D4FD95B4-ED9B-E343-B70F-8C404733D84C}"/>
+      <thm15:themeFamily xmlns:thm15="http://schemas.microsoft.com/office/thememl/2012/main" name="Präsentation14" id="{B1B10406-6147-4A47-95F4-F5DBD10A3872}" vid="{D4FD95B4-ED9B-E343-B70F-8C404733D84C}"/>
     </a:ext>
   </a:extLst>
 </a:theme>
@@ -19655,7 +19796,7 @@
   <a:extraClrSchemeLst/>
   <a:extLst>
     <a:ext uri="{05A4C25C-085E-4340-85A3-A5531E510DB2}">
-      <thm15:themeFamily xmlns="" xmlns:thm15="http://schemas.microsoft.com/office/thememl/2012/main" name="Präsentation14" id="{B1B10406-6147-4A47-95F4-F5DBD10A3872}" vid="{E7490A93-BEAC-FC49-93F3-0CC1118C542C}"/>
+      <thm15:themeFamily xmlns:thm15="http://schemas.microsoft.com/office/thememl/2012/main" name="Präsentation14" id="{B1B10406-6147-4A47-95F4-F5DBD10A3872}" vid="{E7490A93-BEAC-FC49-93F3-0CC1118C542C}"/>
     </a:ext>
   </a:extLst>
 </a:theme>
@@ -19941,7 +20082,7 @@
   <a:extraClrSchemeLst/>
   <a:extLst>
     <a:ext uri="{05A4C25C-085E-4340-85A3-A5531E510DB2}">
-      <thm15:themeFamily xmlns="" xmlns:thm15="http://schemas.microsoft.com/office/thememl/2012/main" name="Präsentation14" id="{B1B10406-6147-4A47-95F4-F5DBD10A3872}" vid="{4DDB14AD-D1C4-854B-AC86-049FDE8761EC}"/>
+      <thm15:themeFamily xmlns:thm15="http://schemas.microsoft.com/office/thememl/2012/main" name="Präsentation14" id="{B1B10406-6147-4A47-95F4-F5DBD10A3872}" vid="{4DDB14AD-D1C4-854B-AC86-049FDE8761EC}"/>
     </a:ext>
   </a:extLst>
 </a:theme>
@@ -20227,7 +20368,7 @@
   <a:extraClrSchemeLst/>
   <a:extLst>
     <a:ext uri="{05A4C25C-085E-4340-85A3-A5531E510DB2}">
-      <thm15:themeFamily xmlns="" xmlns:thm15="http://schemas.microsoft.com/office/thememl/2012/main" name="Präsentation14" id="{B1B10406-6147-4A47-95F4-F5DBD10A3872}" vid="{4F4851FE-32D1-2D41-BECA-D90EB3BB8DB1}"/>
+      <thm15:themeFamily xmlns:thm15="http://schemas.microsoft.com/office/thememl/2012/main" name="Präsentation14" id="{B1B10406-6147-4A47-95F4-F5DBD10A3872}" vid="{4F4851FE-32D1-2D41-BECA-D90EB3BB8DB1}"/>
     </a:ext>
   </a:extLst>
 </a:theme>
@@ -20513,7 +20654,7 @@
   <a:extraClrSchemeLst/>
   <a:extLst>
     <a:ext uri="{05A4C25C-085E-4340-85A3-A5531E510DB2}">
-      <thm15:themeFamily xmlns="" xmlns:thm15="http://schemas.microsoft.com/office/thememl/2012/main" name="Präsentation14" id="{B1B10406-6147-4A47-95F4-F5DBD10A3872}" vid="{13591B48-8E13-6247-8040-92522EC77656}"/>
+      <thm15:themeFamily xmlns:thm15="http://schemas.microsoft.com/office/thememl/2012/main" name="Präsentation14" id="{B1B10406-6147-4A47-95F4-F5DBD10A3872}" vid="{13591B48-8E13-6247-8040-92522EC77656}"/>
     </a:ext>
   </a:extLst>
 </a:theme>
@@ -20799,7 +20940,7 @@
   <a:extraClrSchemeLst/>
   <a:extLst>
     <a:ext uri="{05A4C25C-085E-4340-85A3-A5531E510DB2}">
-      <thm15:themeFamily xmlns="" xmlns:thm15="http://schemas.microsoft.com/office/thememl/2012/main" name="Präsentation14" id="{B1B10406-6147-4A47-95F4-F5DBD10A3872}" vid="{BAD62DF3-579B-3B4C-BB35-887AD0E01A2D}"/>
+      <thm15:themeFamily xmlns:thm15="http://schemas.microsoft.com/office/thememl/2012/main" name="Präsentation14" id="{B1B10406-6147-4A47-95F4-F5DBD10A3872}" vid="{BAD62DF3-579B-3B4C-BB35-887AD0E01A2D}"/>
     </a:ext>
   </a:extLst>
 </a:theme>

</xml_diff>